<commit_message>
Added multiple slide format functionality
</commit_message>
<xml_diff>
--- a/Assets/Sample_PowerPoint_Template.pptx
+++ b/Assets/Sample_PowerPoint_Template.pptx
@@ -6,6 +6,7 @@
   </p:sldMasterIdLst>
   <p:sldIdLst>
     <p:sldId id="256" r:id="rId2"/>
+    <p:sldId id="257" r:id="rId3"/>
   </p:sldIdLst>
   <p:sldSz cx="12192000" cy="6858000"/>
   <p:notesSz cx="6858000" cy="9144000"/>
@@ -160,7 +161,7 @@
           <a:p>
             <a:fld id="{8EAB2250-BC63-FD4D-871A-227CDC492D25}" type="datetimeFigureOut">
               <a:rPr lang="en-US" smtClean="0"/>
-              <a:t>6/19/23</a:t>
+              <a:t>6/20/23</a:t>
             </a:fld>
             <a:endParaRPr lang="en-US"/>
           </a:p>
@@ -1290,6 +1291,501 @@
     <p:extLst>
       <p:ext uri="{BB962C8B-B14F-4D97-AF65-F5344CB8AC3E}">
         <p14:creationId xmlns:p14="http://schemas.microsoft.com/office/powerpoint/2010/main" val="3265565910"/>
+      </p:ext>
+    </p:extLst>
+  </p:cSld>
+  <p:clrMapOvr>
+    <a:masterClrMapping/>
+  </p:clrMapOvr>
+</p:sld>
+</file>
+
+<file path=ppt/slides/slide2.xml><?xml version="1.0" encoding="utf-8"?>
+<p:sld xmlns:a="http://schemas.openxmlformats.org/drawingml/2006/main" xmlns:r="http://schemas.openxmlformats.org/officeDocument/2006/relationships" xmlns:p="http://schemas.openxmlformats.org/presentationml/2006/main">
+  <p:cSld>
+    <p:spTree>
+      <p:nvGrpSpPr>
+        <p:cNvPr id="1" name=""/>
+        <p:cNvGrpSpPr/>
+        <p:nvPr/>
+      </p:nvGrpSpPr>
+      <p:grpSpPr>
+        <a:xfrm>
+          <a:off x="0" y="0"/>
+          <a:ext cx="0" cy="0"/>
+          <a:chOff x="0" y="0"/>
+          <a:chExt cx="0" cy="0"/>
+        </a:xfrm>
+      </p:grpSpPr>
+      <p:sp>
+        <p:nvSpPr>
+          <p:cNvPr id="10" name="L-Shape 9">
+            <a:extLst>
+              <a:ext uri="{FF2B5EF4-FFF2-40B4-BE49-F238E27FC236}">
+                <a16:creationId xmlns:a16="http://schemas.microsoft.com/office/drawing/2014/main" id="{269E831E-061C-2B13-2141-7349213AC97F}"/>
+              </a:ext>
+            </a:extLst>
+          </p:cNvPr>
+          <p:cNvSpPr/>
+          <p:nvPr/>
+        </p:nvSpPr>
+        <p:spPr>
+          <a:xfrm rot="10800000">
+            <a:off x="6289283" y="990347"/>
+            <a:ext cx="4973444" cy="2653991"/>
+          </a:xfrm>
+          <a:prstGeom prst="corner">
+            <a:avLst>
+              <a:gd name="adj1" fmla="val 21031"/>
+              <a:gd name="adj2" fmla="val 21008"/>
+            </a:avLst>
+          </a:prstGeom>
+          <a:solidFill>
+            <a:srgbClr val="FF0000"/>
+          </a:solidFill>
+        </p:spPr>
+        <p:style>
+          <a:lnRef idx="2">
+            <a:schemeClr val="accent1">
+              <a:shade val="15000"/>
+            </a:schemeClr>
+          </a:lnRef>
+          <a:fillRef idx="1">
+            <a:schemeClr val="accent1"/>
+          </a:fillRef>
+          <a:effectRef idx="0">
+            <a:schemeClr val="accent1"/>
+          </a:effectRef>
+          <a:fontRef idx="minor">
+            <a:schemeClr val="lt1"/>
+          </a:fontRef>
+        </p:style>
+        <p:txBody>
+          <a:bodyPr rtlCol="0" anchor="ctr"/>
+          <a:lstStyle/>
+          <a:p>
+            <a:pPr algn="ctr"/>
+            <a:endParaRPr lang="en-US"/>
+          </a:p>
+        </p:txBody>
+      </p:sp>
+      <p:sp>
+        <p:nvSpPr>
+          <p:cNvPr id="11" name="L-Shape 10">
+            <a:extLst>
+              <a:ext uri="{FF2B5EF4-FFF2-40B4-BE49-F238E27FC236}">
+                <a16:creationId xmlns:a16="http://schemas.microsoft.com/office/drawing/2014/main" id="{A8E40246-0E2D-530E-B704-363D36729F0E}"/>
+              </a:ext>
+            </a:extLst>
+          </p:cNvPr>
+          <p:cNvSpPr/>
+          <p:nvPr/>
+        </p:nvSpPr>
+        <p:spPr>
+          <a:xfrm>
+            <a:off x="929260" y="4134989"/>
+            <a:ext cx="4973444" cy="2653991"/>
+          </a:xfrm>
+          <a:prstGeom prst="corner">
+            <a:avLst>
+              <a:gd name="adj1" fmla="val 21429"/>
+              <a:gd name="adj2" fmla="val 21008"/>
+            </a:avLst>
+          </a:prstGeom>
+          <a:solidFill>
+            <a:srgbClr val="7030A0"/>
+          </a:solidFill>
+        </p:spPr>
+        <p:style>
+          <a:lnRef idx="2">
+            <a:schemeClr val="accent1">
+              <a:shade val="15000"/>
+            </a:schemeClr>
+          </a:lnRef>
+          <a:fillRef idx="1">
+            <a:schemeClr val="accent1"/>
+          </a:fillRef>
+          <a:effectRef idx="0">
+            <a:schemeClr val="accent1"/>
+          </a:effectRef>
+          <a:fontRef idx="minor">
+            <a:schemeClr val="lt1"/>
+          </a:fontRef>
+        </p:style>
+        <p:txBody>
+          <a:bodyPr rtlCol="0" anchor="ctr"/>
+          <a:lstStyle/>
+          <a:p>
+            <a:pPr algn="ctr"/>
+            <a:endParaRPr lang="en-US"/>
+          </a:p>
+        </p:txBody>
+      </p:sp>
+      <p:sp>
+        <p:nvSpPr>
+          <p:cNvPr id="12" name="L-Shape 11">
+            <a:extLst>
+              <a:ext uri="{FF2B5EF4-FFF2-40B4-BE49-F238E27FC236}">
+                <a16:creationId xmlns:a16="http://schemas.microsoft.com/office/drawing/2014/main" id="{FBF4A5BA-BBB0-8A1F-C09A-29B4FCF0A3D5}"/>
+              </a:ext>
+            </a:extLst>
+          </p:cNvPr>
+          <p:cNvSpPr/>
+          <p:nvPr/>
+        </p:nvSpPr>
+        <p:spPr>
+          <a:xfrm flipH="1">
+            <a:off x="6289283" y="3971439"/>
+            <a:ext cx="4973444" cy="2817541"/>
+          </a:xfrm>
+          <a:prstGeom prst="corner">
+            <a:avLst>
+              <a:gd name="adj1" fmla="val 20670"/>
+              <a:gd name="adj2" fmla="val 19870"/>
+            </a:avLst>
+          </a:prstGeom>
+          <a:solidFill>
+            <a:srgbClr val="92D050"/>
+          </a:solidFill>
+        </p:spPr>
+        <p:style>
+          <a:lnRef idx="2">
+            <a:schemeClr val="accent1">
+              <a:shade val="15000"/>
+            </a:schemeClr>
+          </a:lnRef>
+          <a:fillRef idx="1">
+            <a:schemeClr val="accent1"/>
+          </a:fillRef>
+          <a:effectRef idx="0">
+            <a:schemeClr val="accent1"/>
+          </a:effectRef>
+          <a:fontRef idx="minor">
+            <a:schemeClr val="lt1"/>
+          </a:fontRef>
+        </p:style>
+        <p:txBody>
+          <a:bodyPr rtlCol="0" anchor="ctr"/>
+          <a:lstStyle/>
+          <a:p>
+            <a:pPr algn="ctr"/>
+            <a:endParaRPr lang="en-US"/>
+          </a:p>
+        </p:txBody>
+      </p:sp>
+      <p:sp>
+        <p:nvSpPr>
+          <p:cNvPr id="13" name="L-Shape 12">
+            <a:extLst>
+              <a:ext uri="{FF2B5EF4-FFF2-40B4-BE49-F238E27FC236}">
+                <a16:creationId xmlns:a16="http://schemas.microsoft.com/office/drawing/2014/main" id="{AE3D1696-CF45-9E90-7B41-5F082D925B57}"/>
+              </a:ext>
+            </a:extLst>
+          </p:cNvPr>
+          <p:cNvSpPr/>
+          <p:nvPr/>
+        </p:nvSpPr>
+        <p:spPr>
+          <a:xfrm rot="10800000" flipH="1">
+            <a:off x="929260" y="990348"/>
+            <a:ext cx="4973444" cy="2817541"/>
+          </a:xfrm>
+          <a:prstGeom prst="corner">
+            <a:avLst>
+              <a:gd name="adj1" fmla="val 19357"/>
+              <a:gd name="adj2" fmla="val 19870"/>
+            </a:avLst>
+          </a:prstGeom>
+          <a:solidFill>
+            <a:schemeClr val="accent2"/>
+          </a:solidFill>
+        </p:spPr>
+        <p:style>
+          <a:lnRef idx="2">
+            <a:schemeClr val="accent1">
+              <a:shade val="15000"/>
+            </a:schemeClr>
+          </a:lnRef>
+          <a:fillRef idx="1">
+            <a:schemeClr val="accent1"/>
+          </a:fillRef>
+          <a:effectRef idx="0">
+            <a:schemeClr val="accent1"/>
+          </a:effectRef>
+          <a:fontRef idx="minor">
+            <a:schemeClr val="lt1"/>
+          </a:fontRef>
+        </p:style>
+        <p:txBody>
+          <a:bodyPr rtlCol="0" anchor="ctr"/>
+          <a:lstStyle/>
+          <a:p>
+            <a:pPr algn="ctr"/>
+            <a:endParaRPr lang="en-US"/>
+          </a:p>
+        </p:txBody>
+      </p:sp>
+      <p:sp>
+        <p:nvSpPr>
+          <p:cNvPr id="15" name="Rectangle 14">
+            <a:extLst>
+              <a:ext uri="{FF2B5EF4-FFF2-40B4-BE49-F238E27FC236}">
+                <a16:creationId xmlns:a16="http://schemas.microsoft.com/office/drawing/2014/main" id="{569C9B4A-CCF8-4C3F-43DF-E7F9CA8009B8}"/>
+              </a:ext>
+            </a:extLst>
+          </p:cNvPr>
+          <p:cNvSpPr/>
+          <p:nvPr/>
+        </p:nvSpPr>
+        <p:spPr>
+          <a:xfrm>
+            <a:off x="1782305" y="1813300"/>
+            <a:ext cx="4120399" cy="1831039"/>
+          </a:xfrm>
+          <a:prstGeom prst="rect">
+            <a:avLst/>
+          </a:prstGeom>
+          <a:solidFill>
+            <a:schemeClr val="accent2"/>
+          </a:solidFill>
+        </p:spPr>
+        <p:style>
+          <a:lnRef idx="2">
+            <a:schemeClr val="accent1">
+              <a:shade val="15000"/>
+            </a:schemeClr>
+          </a:lnRef>
+          <a:fillRef idx="1">
+            <a:schemeClr val="accent1"/>
+          </a:fillRef>
+          <a:effectRef idx="0">
+            <a:schemeClr val="accent1"/>
+          </a:effectRef>
+          <a:fontRef idx="minor">
+            <a:schemeClr val="lt1"/>
+          </a:fontRef>
+        </p:style>
+        <p:txBody>
+          <a:bodyPr rtlCol="0" anchor="ctr"/>
+          <a:lstStyle/>
+          <a:p>
+            <a:pPr algn="ctr"/>
+            <a:r>
+              <a:rPr lang="en-US" sz="2400" b="1" dirty="0"/>
+              <a:t>%Text1</a:t>
+            </a:r>
+          </a:p>
+        </p:txBody>
+      </p:sp>
+      <p:sp>
+        <p:nvSpPr>
+          <p:cNvPr id="16" name="Rectangle 15">
+            <a:extLst>
+              <a:ext uri="{FF2B5EF4-FFF2-40B4-BE49-F238E27FC236}">
+                <a16:creationId xmlns:a16="http://schemas.microsoft.com/office/drawing/2014/main" id="{57995B0F-80B9-D281-F067-F3D892533550}"/>
+              </a:ext>
+            </a:extLst>
+          </p:cNvPr>
+          <p:cNvSpPr/>
+          <p:nvPr/>
+        </p:nvSpPr>
+        <p:spPr>
+          <a:xfrm>
+            <a:off x="1782305" y="4134989"/>
+            <a:ext cx="4120399" cy="1831039"/>
+          </a:xfrm>
+          <a:prstGeom prst="rect">
+            <a:avLst/>
+          </a:prstGeom>
+          <a:solidFill>
+            <a:srgbClr val="7030A0"/>
+          </a:solidFill>
+        </p:spPr>
+        <p:style>
+          <a:lnRef idx="2">
+            <a:schemeClr val="accent1">
+              <a:shade val="15000"/>
+            </a:schemeClr>
+          </a:lnRef>
+          <a:fillRef idx="1">
+            <a:schemeClr val="accent1"/>
+          </a:fillRef>
+          <a:effectRef idx="0">
+            <a:schemeClr val="accent1"/>
+          </a:effectRef>
+          <a:fontRef idx="minor">
+            <a:schemeClr val="lt1"/>
+          </a:fontRef>
+        </p:style>
+        <p:txBody>
+          <a:bodyPr rtlCol="0" anchor="ctr"/>
+          <a:lstStyle/>
+          <a:p>
+            <a:pPr algn="ctr"/>
+            <a:r>
+              <a:rPr lang="en-US" sz="2400" b="1" dirty="0"/>
+              <a:t>%Text3</a:t>
+            </a:r>
+          </a:p>
+        </p:txBody>
+      </p:sp>
+      <p:sp>
+        <p:nvSpPr>
+          <p:cNvPr id="17" name="Rectangle 16">
+            <a:extLst>
+              <a:ext uri="{FF2B5EF4-FFF2-40B4-BE49-F238E27FC236}">
+                <a16:creationId xmlns:a16="http://schemas.microsoft.com/office/drawing/2014/main" id="{0A67D039-8828-92D2-40AB-80C39F48E5D3}"/>
+              </a:ext>
+            </a:extLst>
+          </p:cNvPr>
+          <p:cNvSpPr/>
+          <p:nvPr/>
+        </p:nvSpPr>
+        <p:spPr>
+          <a:xfrm>
+            <a:off x="6289283" y="1813300"/>
+            <a:ext cx="4120399" cy="1831039"/>
+          </a:xfrm>
+          <a:prstGeom prst="rect">
+            <a:avLst/>
+          </a:prstGeom>
+          <a:solidFill>
+            <a:srgbClr val="FF0000"/>
+          </a:solidFill>
+        </p:spPr>
+        <p:style>
+          <a:lnRef idx="2">
+            <a:schemeClr val="accent1">
+              <a:shade val="15000"/>
+            </a:schemeClr>
+          </a:lnRef>
+          <a:fillRef idx="1">
+            <a:schemeClr val="accent1"/>
+          </a:fillRef>
+          <a:effectRef idx="0">
+            <a:schemeClr val="accent1"/>
+          </a:effectRef>
+          <a:fontRef idx="minor">
+            <a:schemeClr val="lt1"/>
+          </a:fontRef>
+        </p:style>
+        <p:txBody>
+          <a:bodyPr rtlCol="0" anchor="ctr"/>
+          <a:lstStyle/>
+          <a:p>
+            <a:pPr algn="ctr"/>
+            <a:r>
+              <a:rPr lang="en-US" sz="2400" b="1" dirty="0"/>
+              <a:t>%Text2</a:t>
+            </a:r>
+          </a:p>
+        </p:txBody>
+      </p:sp>
+      <p:sp>
+        <p:nvSpPr>
+          <p:cNvPr id="18" name="Rectangle 17">
+            <a:extLst>
+              <a:ext uri="{FF2B5EF4-FFF2-40B4-BE49-F238E27FC236}">
+                <a16:creationId xmlns:a16="http://schemas.microsoft.com/office/drawing/2014/main" id="{88CA3750-7CA0-69CD-8D3F-D0F9E866EB52}"/>
+              </a:ext>
+            </a:extLst>
+          </p:cNvPr>
+          <p:cNvSpPr/>
+          <p:nvPr/>
+        </p:nvSpPr>
+        <p:spPr>
+          <a:xfrm>
+            <a:off x="6289283" y="4134989"/>
+            <a:ext cx="4120399" cy="1831039"/>
+          </a:xfrm>
+          <a:prstGeom prst="rect">
+            <a:avLst/>
+          </a:prstGeom>
+          <a:solidFill>
+            <a:srgbClr val="92D050"/>
+          </a:solidFill>
+        </p:spPr>
+        <p:style>
+          <a:lnRef idx="2">
+            <a:schemeClr val="accent1">
+              <a:shade val="15000"/>
+            </a:schemeClr>
+          </a:lnRef>
+          <a:fillRef idx="1">
+            <a:schemeClr val="accent1"/>
+          </a:fillRef>
+          <a:effectRef idx="0">
+            <a:schemeClr val="accent1"/>
+          </a:effectRef>
+          <a:fontRef idx="minor">
+            <a:schemeClr val="lt1"/>
+          </a:fontRef>
+        </p:style>
+        <p:txBody>
+          <a:bodyPr rtlCol="0" anchor="ctr"/>
+          <a:lstStyle/>
+          <a:p>
+            <a:pPr algn="ctr"/>
+            <a:r>
+              <a:rPr lang="en-US" sz="2400" b="1" dirty="0"/>
+              <a:t>%Text4</a:t>
+            </a:r>
+          </a:p>
+        </p:txBody>
+      </p:sp>
+      <p:sp>
+        <p:nvSpPr>
+          <p:cNvPr id="19" name="Rectangle 18">
+            <a:extLst>
+              <a:ext uri="{FF2B5EF4-FFF2-40B4-BE49-F238E27FC236}">
+                <a16:creationId xmlns:a16="http://schemas.microsoft.com/office/drawing/2014/main" id="{3E0C38E5-F8C6-2AC7-C9E3-A9B9AA42DA66}"/>
+              </a:ext>
+            </a:extLst>
+          </p:cNvPr>
+          <p:cNvSpPr/>
+          <p:nvPr/>
+        </p:nvSpPr>
+        <p:spPr>
+          <a:xfrm>
+            <a:off x="929259" y="185980"/>
+            <a:ext cx="10333468" cy="573437"/>
+          </a:xfrm>
+          <a:prstGeom prst="rect">
+            <a:avLst/>
+          </a:prstGeom>
+        </p:spPr>
+        <p:style>
+          <a:lnRef idx="2">
+            <a:schemeClr val="accent1">
+              <a:shade val="15000"/>
+            </a:schemeClr>
+          </a:lnRef>
+          <a:fillRef idx="1">
+            <a:schemeClr val="accent1"/>
+          </a:fillRef>
+          <a:effectRef idx="0">
+            <a:schemeClr val="accent1"/>
+          </a:effectRef>
+          <a:fontRef idx="minor">
+            <a:schemeClr val="lt1"/>
+          </a:fontRef>
+        </p:style>
+        <p:txBody>
+          <a:bodyPr rtlCol="0" anchor="ctr"/>
+          <a:lstStyle/>
+          <a:p>
+            <a:pPr algn="ctr"/>
+            <a:r>
+              <a:rPr lang="en-US" sz="2800" b="1" dirty="0"/>
+              <a:t>%Title</a:t>
+            </a:r>
+          </a:p>
+        </p:txBody>
+      </p:sp>
+    </p:spTree>
+    <p:extLst>
+      <p:ext uri="{BB962C8B-B14F-4D97-AF65-F5344CB8AC3E}">
+        <p14:creationId xmlns:p14="http://schemas.microsoft.com/office/powerpoint/2010/main" val="1071977138"/>
       </p:ext>
     </p:extLst>
   </p:cSld>

</xml_diff>